<commit_message>
Tune some hyper parameters
</commit_message>
<xml_diff>
--- a/images/model_architecture.pptx
+++ b/images/model_architecture.pptx
@@ -266,7 +266,7 @@
           <a:p>
             <a:fld id="{C458CF93-ED50-46E9-8CBB-73D3A2246EBD}" type="datetimeFigureOut">
               <a:rPr lang="en-SG" smtClean="0"/>
-              <a:t>14/6/2019</a:t>
+              <a:t>16/6/2019</a:t>
             </a:fld>
             <a:endParaRPr lang="en-SG"/>
           </a:p>
@@ -466,7 +466,7 @@
           <a:p>
             <a:fld id="{C458CF93-ED50-46E9-8CBB-73D3A2246EBD}" type="datetimeFigureOut">
               <a:rPr lang="en-SG" smtClean="0"/>
-              <a:t>14/6/2019</a:t>
+              <a:t>16/6/2019</a:t>
             </a:fld>
             <a:endParaRPr lang="en-SG"/>
           </a:p>
@@ -676,7 +676,7 @@
           <a:p>
             <a:fld id="{C458CF93-ED50-46E9-8CBB-73D3A2246EBD}" type="datetimeFigureOut">
               <a:rPr lang="en-SG" smtClean="0"/>
-              <a:t>14/6/2019</a:t>
+              <a:t>16/6/2019</a:t>
             </a:fld>
             <a:endParaRPr lang="en-SG"/>
           </a:p>
@@ -876,7 +876,7 @@
           <a:p>
             <a:fld id="{C458CF93-ED50-46E9-8CBB-73D3A2246EBD}" type="datetimeFigureOut">
               <a:rPr lang="en-SG" smtClean="0"/>
-              <a:t>14/6/2019</a:t>
+              <a:t>16/6/2019</a:t>
             </a:fld>
             <a:endParaRPr lang="en-SG"/>
           </a:p>
@@ -1152,7 +1152,7 @@
           <a:p>
             <a:fld id="{C458CF93-ED50-46E9-8CBB-73D3A2246EBD}" type="datetimeFigureOut">
               <a:rPr lang="en-SG" smtClean="0"/>
-              <a:t>14/6/2019</a:t>
+              <a:t>16/6/2019</a:t>
             </a:fld>
             <a:endParaRPr lang="en-SG"/>
           </a:p>
@@ -1420,7 +1420,7 @@
           <a:p>
             <a:fld id="{C458CF93-ED50-46E9-8CBB-73D3A2246EBD}" type="datetimeFigureOut">
               <a:rPr lang="en-SG" smtClean="0"/>
-              <a:t>14/6/2019</a:t>
+              <a:t>16/6/2019</a:t>
             </a:fld>
             <a:endParaRPr lang="en-SG"/>
           </a:p>
@@ -1835,7 +1835,7 @@
           <a:p>
             <a:fld id="{C458CF93-ED50-46E9-8CBB-73D3A2246EBD}" type="datetimeFigureOut">
               <a:rPr lang="en-SG" smtClean="0"/>
-              <a:t>14/6/2019</a:t>
+              <a:t>16/6/2019</a:t>
             </a:fld>
             <a:endParaRPr lang="en-SG"/>
           </a:p>
@@ -1977,7 +1977,7 @@
           <a:p>
             <a:fld id="{C458CF93-ED50-46E9-8CBB-73D3A2246EBD}" type="datetimeFigureOut">
               <a:rPr lang="en-SG" smtClean="0"/>
-              <a:t>14/6/2019</a:t>
+              <a:t>16/6/2019</a:t>
             </a:fld>
             <a:endParaRPr lang="en-SG"/>
           </a:p>
@@ -2090,7 +2090,7 @@
           <a:p>
             <a:fld id="{C458CF93-ED50-46E9-8CBB-73D3A2246EBD}" type="datetimeFigureOut">
               <a:rPr lang="en-SG" smtClean="0"/>
-              <a:t>14/6/2019</a:t>
+              <a:t>16/6/2019</a:t>
             </a:fld>
             <a:endParaRPr lang="en-SG"/>
           </a:p>
@@ -2403,7 +2403,7 @@
           <a:p>
             <a:fld id="{C458CF93-ED50-46E9-8CBB-73D3A2246EBD}" type="datetimeFigureOut">
               <a:rPr lang="en-SG" smtClean="0"/>
-              <a:t>14/6/2019</a:t>
+              <a:t>16/6/2019</a:t>
             </a:fld>
             <a:endParaRPr lang="en-SG"/>
           </a:p>
@@ -2692,7 +2692,7 @@
           <a:p>
             <a:fld id="{C458CF93-ED50-46E9-8CBB-73D3A2246EBD}" type="datetimeFigureOut">
               <a:rPr lang="en-SG" smtClean="0"/>
-              <a:t>14/6/2019</a:t>
+              <a:t>16/6/2019</a:t>
             </a:fld>
             <a:endParaRPr lang="en-SG"/>
           </a:p>
@@ -2935,7 +2935,7 @@
           <a:p>
             <a:fld id="{C458CF93-ED50-46E9-8CBB-73D3A2246EBD}" type="datetimeFigureOut">
               <a:rPr lang="en-SG" smtClean="0"/>
-              <a:t>14/6/2019</a:t>
+              <a:t>16/6/2019</a:t>
             </a:fld>
             <a:endParaRPr lang="en-SG"/>
           </a:p>
@@ -3936,7 +3936,7 @@
             </a:pPr>
             <a:r>
               <a:rPr lang="en-US" dirty="0"/>
-              <a:t> Convert the value for “Timestamp” into minutes and divide the value by 15mins as the interval between 2 timestamp is 15mins. Divide the new value by 190 so that the value is between [0,0.5].</a:t>
+              <a:t> Convert the value for “Timestamp” into minutes and divide the value by 15mins as the interval between 2 timestamp is 15mins. Divide the new value by 380 so that the value is between [0,0.25].</a:t>
             </a:r>
           </a:p>
           <a:p>
@@ -8113,7 +8113,7 @@
           <a:p>
             <a:r>
               <a:rPr lang="en-US" sz="2000" dirty="0"/>
-              <a:t>Initialize with a 25 x 5 tensor filled with 0.5 </a:t>
+              <a:t>Initialize with a 25 x 5 tensor filled with 0 </a:t>
             </a:r>
             <a:endParaRPr lang="en-SG" sz="2000" dirty="0"/>
           </a:p>

</xml_diff>